<commit_message>
Secured API keys with .env and cleaned tracked files
</commit_message>
<xml_diff>
--- a/summary.pptx
+++ b/summary.pptx
@@ -4050,7 +4050,7 @@
           <a:lstStyle/>
           <a:p>
             <a:r>
-              <a:t>Cryptocurrency, Bitcoin, and Their Future Impact</a:t>
+              <a:t>Sanyam Purohit: MCA Student Profile</a:t>
             </a:r>
           </a:p>
         </p:txBody>
@@ -4071,7 +4071,7 @@
           <a:lstStyle/>
           <a:p>
             <a:r>
-              <a:t>Source: 2016CriptocurrencyIJBMC</a:t>
+              <a:t>Source: Sanyam_Purohit_Resume</a:t>
             </a:r>
           </a:p>
         </p:txBody>
@@ -4110,7 +4110,7 @@
           <a:lstStyle/>
           <a:p>
             <a:r>
-              <a:t>Opportunities for Transformation</a:t>
+              <a:t>Technical Skills</a:t>
             </a:r>
           </a:p>
         </p:txBody>
@@ -4138,7 +4138,7 @@
               <a:defRPr sz="1800"/>
             </a:pPr>
             <a:r>
-              <a:t>Cryptocurrencies can address problems faced by unbanked populations—60% of Latin America’s 600 million people lack bank accounts, but 70% have mobile phones.</a:t>
+              <a:t>Frontend: HTML, CSS</a:t>
             </a:r>
           </a:p>
           <a:p>
@@ -4149,7 +4149,7 @@
               <a:defRPr sz="1800"/>
             </a:pPr>
             <a:r>
-              <a:t>Peer-to-peer transactions can occur with just a smartphone the need for traditional banks.</a:t>
+              <a:t>Backend: PHP, Java, Python, ASP.NET with C#, Swift</a:t>
             </a:r>
           </a:p>
           <a:p>
@@ -4160,7 +4160,7 @@
               <a:defRPr sz="1800"/>
             </a:pPr>
             <a:r>
-              <a:t>Expanding usability and developer-driven improvements in cryptocurrency applications could fuel further adoption.</a:t>
+              <a:t>Database: MySql, Oracle, SQL Server</a:t>
             </a:r>
           </a:p>
           <a:p>
@@ -4171,18 +4171,7 @@
               <a:defRPr sz="1800"/>
             </a:pPr>
             <a:r>
-              <a:t>Businesses benefit from rapid, low-fee, international transactions—important for time-sensitive needs (e.g., during cyberattacks).</a:t>
-            </a:r>
-          </a:p>
-          <a:p>
-            <a:pPr algn="l">
-              <a:spcAft>
-                <a:spcPts val="1000"/>
-              </a:spcAft>
-              <a:defRPr sz="1800"/>
-            </a:pPr>
-            <a:r>
-              <a:t>Cryptocurrencies could disrupt industries reliant on third-party clearing systems.</a:t>
+              <a:t>Tools: Visual Studio, Eclipse, XAMPP, Xcode, Android Studio</a:t>
             </a:r>
           </a:p>
         </p:txBody>
@@ -4221,7 +4210,7 @@
           <a:lstStyle/>
           <a:p>
             <a:r>
-              <a:t>Key Events and Market Developments</a:t>
+              <a:t>Projects</a:t>
             </a:r>
           </a:p>
         </p:txBody>
@@ -4260,7 +4249,7 @@
           <a:lstStyle/>
           <a:p>
             <a:r>
-              <a:t>Key Events and Market Developments</a:t>
+              <a:t>Projects</a:t>
             </a:r>
           </a:p>
         </p:txBody>
@@ -4288,7 +4277,7 @@
               <a:defRPr sz="1800"/>
             </a:pPr>
             <a:r>
-              <a:t>BitPay transaction rates grew 110% in the previous 12 months as of 2016, signifying rising user acceptance.</a:t>
+              <a:t>VASUDHA (Online Society Management System)</a:t>
             </a:r>
           </a:p>
           <a:p>
@@ -4299,7 +4288,7 @@
               <a:defRPr sz="1800"/>
             </a:pPr>
             <a:r>
-              <a:t>Brexit Example: Bitcoin’s price dropped ~15% before the UK vote, then rose from $550 to $650 post-vote as global markets declined.</a:t>
+              <a:t>ASP.NET (C#) | 2.5 months</a:t>
             </a:r>
           </a:p>
           <a:p>
@@ -4310,7 +4299,7 @@
               <a:defRPr sz="1800"/>
             </a:pPr>
             <a:r>
-              <a:t>Regulatory changes (.</a:t>
+              <a:t>Streamlines society operations and member-management communication</a:t>
             </a:r>
           </a:p>
           <a:p>
@@ -4321,7 +4310,40 @@
               <a:defRPr sz="1800"/>
             </a:pPr>
             <a:r>
-              <a:t>High-profile security incidents (Mt Gox, Ethereum) and illegal use cases (Silk Road) have shaped public and investor perceptions.</a:t>
+              <a:t>GOODKARMA (Micro Donation Platform)</a:t>
+            </a:r>
+          </a:p>
+          <a:p>
+            <a:pPr algn="l">
+              <a:spcAft>
+                <a:spcPts val="1000"/>
+              </a:spcAft>
+              <a:defRPr sz="1800"/>
+            </a:pPr>
+            <a:r>
+              <a:t>ASP.NET (C#) | 3 months</a:t>
+            </a:r>
+          </a:p>
+          <a:p>
+            <a:pPr algn="l">
+              <a:spcAft>
+                <a:spcPts val="1000"/>
+              </a:spcAft>
+              <a:defRPr sz="1800"/>
+            </a:pPr>
+            <a:r>
+              <a:t>Features: User authentication, donation tracking, admin/donor roles</a:t>
+            </a:r>
+          </a:p>
+          <a:p>
+            <a:pPr algn="l">
+              <a:spcAft>
+                <a:spcPts val="1000"/>
+              </a:spcAft>
+              <a:defRPr sz="1800"/>
+            </a:pPr>
+            <a:r>
+              <a:t>Supports transparent micro-donations for social causes</a:t>
             </a:r>
           </a:p>
         </p:txBody>
@@ -4360,7 +4382,7 @@
           <a:lstStyle/>
           <a:p>
             <a:r>
-              <a:t>The Future Outlook</a:t>
+              <a:t>Certifications &amp; Workshops</a:t>
             </a:r>
           </a:p>
         </p:txBody>
@@ -4399,7 +4421,7 @@
           <a:lstStyle/>
           <a:p>
             <a:r>
-              <a:t>The Future Outlook</a:t>
+              <a:t>Certifications &amp; Workshops</a:t>
             </a:r>
           </a:p>
         </p:txBody>
@@ -4427,7 +4449,7 @@
               <a:defRPr sz="1800"/>
             </a:pPr>
             <a:r>
-              <a:t>Cryptocurrency adoption depends on overcoming technical, security, and perception challenges.</a:t>
+              <a:t>5-Day Workshop on Laravel &amp; WordPress: Jan 2025 (LDRP Institute, Prof. Adarsh Patel)</a:t>
             </a:r>
           </a:p>
           <a:p>
@@ -4438,18 +4460,7 @@
               <a:defRPr sz="1800"/>
             </a:pPr>
             <a:r>
-              <a:t>Innovation, user/vendor acceptance, and effective marketing are key to legitimizing Bitcoin as a widespread currency.</a:t>
-            </a:r>
-          </a:p>
-          <a:p>
-            <a:pPr algn="l">
-              <a:spcAft>
-                <a:spcPts val="1000"/>
-              </a:spcAft>
-              <a:defRPr sz="1800"/>
-            </a:pPr>
-            <a:r>
-              <a:t>As global markets and technology evolve, cryptocurrencies may continue to shift financial and economic paradigms.</a:t>
+              <a:t>AI for Students – Build Your Own Generative AI Model: Sep 2023 (NXT WAVE/IIT Delhi)</a:t>
             </a:r>
           </a:p>
         </p:txBody>
@@ -4555,7 +4566,7 @@
               <a:defRPr sz="1800"/>
             </a:pPr>
             <a:r>
-              <a:t>Cryptocurrency and Bitcoin offer both disruptive potential and significant challenges for global finance.</a:t>
+              <a:t>Aspiring developer with strong academic foundation and hands-on project experience.</a:t>
             </a:r>
           </a:p>
           <a:p>
@@ -4566,16 +4577,8 @@
               <a:defRPr sz="1800"/>
             </a:pPr>
             <a:r>
-              <a:t>Their future impact will depend on continued innovation, security improvements, adoption, and the ability to address market and regulatory concerns.</a:t>
-            </a:r>
-          </a:p>
-          <a:p>
-            <a:pPr algn="l">
-              <a:spcAft>
-                <a:spcPts val="1000"/>
-              </a:spcAft>
-              <a:defRPr sz="1800"/>
-            </a:pPr>
+              <a:t>Demonstrates proficiency in diverse technologies and eagerness for continuous growth.</a:t>
+            </a:r>
           </a:p>
         </p:txBody>
       </p:sp>
@@ -4638,7 +4641,7 @@
               <a:defRPr sz="1800"/>
             </a:pPr>
             <a:r>
-              <a:t>Introduction to Cryptocurrency and Bitcoin</a:t>
+              <a:t>Contact Information</a:t>
             </a:r>
           </a:p>
           <a:p>
@@ -4646,7 +4649,7 @@
               <a:defRPr sz="1800"/>
             </a:pPr>
             <a:r>
-              <a:t>Bitcoin's Strengths and Global Adoption</a:t>
+              <a:t>Summary</a:t>
             </a:r>
           </a:p>
           <a:p>
@@ -4654,7 +4657,7 @@
               <a:defRPr sz="1800"/>
             </a:pPr>
             <a:r>
-              <a:t>Weaknesses and Risks of Bitcoin</a:t>
+              <a:t>Education</a:t>
             </a:r>
           </a:p>
           <a:p>
@@ -4662,7 +4665,7 @@
               <a:defRPr sz="1800"/>
             </a:pPr>
             <a:r>
-              <a:t>Opportunities for Transformation</a:t>
+              <a:t>Technical Skills</a:t>
             </a:r>
           </a:p>
           <a:p>
@@ -4670,7 +4673,7 @@
               <a:defRPr sz="1800"/>
             </a:pPr>
             <a:r>
-              <a:t>Key Events and Market Developments</a:t>
+              <a:t>Projects</a:t>
             </a:r>
           </a:p>
           <a:p>
@@ -4678,15 +4681,7 @@
               <a:defRPr sz="1800"/>
             </a:pPr>
             <a:r>
-              <a:t>The Future Outlook</a:t>
-            </a:r>
-          </a:p>
-          <a:p>
-            <a:pPr>
-              <a:defRPr sz="1800"/>
-            </a:pPr>
-            <a:r>
-              <a:t>Conclusion</a:t>
+              <a:t>Certifications &amp; Workshops</a:t>
             </a:r>
           </a:p>
         </p:txBody>
@@ -4725,7 +4720,7 @@
           <a:lstStyle/>
           <a:p>
             <a:r>
-              <a:t>Introduction to Cryptocurrency and Bitcoin</a:t>
+              <a:t>Contact Information</a:t>
             </a:r>
           </a:p>
         </p:txBody>
@@ -4764,7 +4759,7 @@
           <a:lstStyle/>
           <a:p>
             <a:r>
-              <a:t>Introduction to Cryptocurrency and Bitcoin</a:t>
+              <a:t>Contact Information</a:t>
             </a:r>
           </a:p>
         </p:txBody>
@@ -4792,7 +4787,7 @@
               <a:defRPr sz="1800"/>
             </a:pPr>
             <a:r>
-              <a:t>Cryptocurrency is an encrypted, peer-to-peer digital barter system developed around 2008.</a:t>
+              <a:t>Sabarkantha, Gujarat</a:t>
             </a:r>
           </a:p>
           <a:p>
@@ -4803,7 +4798,7 @@
               <a:defRPr sz="1800"/>
             </a:pPr>
             <a:r>
-              <a:t>Bitcoin, the first and most popular cryptocurrency, enables digital value exchange without third-party oversight.</a:t>
+              <a:t>purohitsanyam0311@gmail.com</a:t>
             </a:r>
           </a:p>
           <a:p>
@@ -4814,29 +4809,7 @@
               <a:defRPr sz="1800"/>
             </a:pPr>
             <a:r>
-              <a:t>There is a finite limit of 21 million bitcoins, ensuring scarcity and driving value through trust and acceptance.</a:t>
-            </a:r>
-          </a:p>
-          <a:p>
-            <a:pPr algn="l">
-              <a:spcAft>
-                <a:spcPts val="1000"/>
-              </a:spcAft>
-              <a:defRPr sz="1800"/>
-            </a:pPr>
-            <a:r>
-              <a:t>Cryptocurrencies challenge longstanding financial systems and can disrupt global trade paradigms.</a:t>
-            </a:r>
-          </a:p>
-          <a:p>
-            <a:pPr algn="l">
-              <a:spcAft>
-                <a:spcPts val="1000"/>
-              </a:spcAft>
-              <a:defRPr sz="1800"/>
-            </a:pPr>
-            <a:r>
-              <a:t>Market acceptance, vendor adoption, and innovation are critical for mainstream cryptocurrency success.</a:t>
+              <a:t>+91 9408814497</a:t>
             </a:r>
           </a:p>
         </p:txBody>
@@ -4875,7 +4848,7 @@
           <a:lstStyle/>
           <a:p>
             <a:r>
-              <a:t>Bitcoin's Strengths and Global Adoption</a:t>
+              <a:t>Summary</a:t>
             </a:r>
           </a:p>
         </p:txBody>
@@ -4914,7 +4887,7 @@
           <a:lstStyle/>
           <a:p>
             <a:r>
-              <a:t>Bitcoin's Strengths and Global Adoption</a:t>
+              <a:t>Summary</a:t>
             </a:r>
           </a:p>
         </p:txBody>
@@ -4942,7 +4915,7 @@
               <a:defRPr sz="1800"/>
             </a:pPr>
             <a:r>
-              <a:t>Bitcoin’s fixed supply (21 million) prevents inflation from oversupply and serves as a "safe haven" against inflating national currencies.</a:t>
+              <a:t>First-year MCA student focused on software development</a:t>
             </a:r>
           </a:p>
           <a:p>
@@ -4953,7 +4926,7 @@
               <a:defRPr sz="1800"/>
             </a:pPr>
             <a:r>
-              <a:t>In 2015, Bitcoin was the best performing currency using the US Dollar Index.</a:t>
+              <a:t>Strengths in programming, problem-solving, and learning new technologies</a:t>
             </a:r>
           </a:p>
           <a:p>
@@ -4964,7 +4937,7 @@
               <a:defRPr sz="1800"/>
             </a:pPr>
             <a:r>
-              <a:t>South America, especially Argentina, saw a 510% increase in bitcoin transactions from 2014 to 2015 due to inflation and banking restrictions.</a:t>
+              <a:t>Passionate about hands-on projects and real-world applications</a:t>
             </a:r>
           </a:p>
           <a:p>
@@ -4975,18 +4948,7 @@
               <a:defRPr sz="1800"/>
             </a:pPr>
             <a:r>
-              <a:t>Bitcoin's agility enables quick, borderless transactions, appealing during global financial instability.</a:t>
-            </a:r>
-          </a:p>
-          <a:p>
-            <a:pPr algn="l">
-              <a:spcAft>
-                <a:spcPts val="1000"/>
-              </a:spcAft>
-              <a:defRPr sz="1800"/>
-            </a:pPr>
-            <a:r>
-              <a:t>User and vendor adoption reinforce each other in a positive cycle, potentially accelerating mainstream use.</a:t>
+              <a:t>Actively seeking growth and contribution opportunities</a:t>
             </a:r>
           </a:p>
         </p:txBody>
@@ -5025,7 +4987,7 @@
           <a:lstStyle/>
           <a:p>
             <a:r>
-              <a:t>Weaknesses and Risks of Bitcoin</a:t>
+              <a:t>Education</a:t>
             </a:r>
           </a:p>
         </p:txBody>
@@ -5064,7 +5026,7 @@
           <a:lstStyle/>
           <a:p>
             <a:r>
-              <a:t>Weaknesses and Risks of Bitcoin</a:t>
+              <a:t>Education</a:t>
             </a:r>
           </a:p>
         </p:txBody>
@@ -5092,7 +5054,7 @@
               <a:defRPr sz="1800"/>
             </a:pPr>
             <a:r>
-              <a:t>Bitcoin’s blockchain is public, providing only semi-anonymity and raising privacy concerns.</a:t>
+              <a:t>Master of Computer Applications (MCA): 2024 - Current, Kadi Sarva Vishwavidyalaya (Gujarat)</a:t>
             </a:r>
           </a:p>
           <a:p>
@@ -5103,7 +5065,7 @@
               <a:defRPr sz="1800"/>
             </a:pPr>
             <a:r>
-              <a:t>Vulnerable to network attacks such as DDoS by miners and exchanges.</a:t>
+              <a:t>Bachelor of Computer Applications (BCA): 2021 - 2024, HNGU (Gujarat), CGPA: 9.28</a:t>
             </a:r>
           </a:p>
           <a:p>
@@ -5114,29 +5076,7 @@
               <a:defRPr sz="1800"/>
             </a:pPr>
             <a:r>
-              <a:t>Association with illegal activities (e.g., Silk Road: nearly $1 billion in sales) has harmed its reputation.</a:t>
-            </a:r>
-          </a:p>
-          <a:p>
-            <a:pPr algn="l">
-              <a:spcAft>
-                <a:spcPts val="1000"/>
-              </a:spcAft>
-              <a:defRPr sz="1800"/>
-            </a:pPr>
-            <a:r>
-              <a:t>Security breaches (e.g., Mt Gox hack: ~$460ving events” reduce mining rewards, potentially pushing out smaller miners and reducing network security.</a:t>
-            </a:r>
-          </a:p>
-          <a:p>
-            <a:pPr algn="l">
-              <a:spcAft>
-                <a:spcPts val="1000"/>
-              </a:spcAft>
-              <a:defRPr sz="1800"/>
-            </a:pPr>
-            <a:r>
-              <a:t>High price volatility and shallow markets limit investor and merchant confidence.</a:t>
+              <a:t>Higher Secondary (XII): 2020 - 2021, GHSEB (Gujarat), Percentage: 83.57%</a:t>
             </a:r>
           </a:p>
         </p:txBody>
@@ -5175,7 +5115,7 @@
           <a:lstStyle/>
           <a:p>
             <a:r>
-              <a:t>Opportunities for Transformation</a:t>
+              <a:t>Technical Skills</a:t>
             </a:r>
           </a:p>
         </p:txBody>

</xml_diff>